<commit_message>
tej part added to ppt
</commit_message>
<xml_diff>
--- a/CS498-Group8.pptx
+++ b/CS498-Group8.pptx
@@ -123,6 +123,11 @@
       </a:defRPr>
     </a:lvl9pPr>
   </p:defaultTextStyle>
+  <p:extLst>
+    <p:ext uri="{EFAFB233-063F-42B5-8137-9DF3F51BA10A}">
+      <p15:sldGuideLst xmlns:p15="http://schemas.microsoft.com/office/powerpoint/2012/main"/>
+    </p:ext>
+  </p:extLst>
 </p:presentation>
 </file>
 
@@ -3428,7 +3433,7 @@
                 </a:solidFill>
                 <a:latin typeface="Century Gothic"/>
               </a:rPr>
-              <a:t>4/14/19</a:t>
+              <a:t>4/15/19</a:t>
             </a:fld>
             <a:endParaRPr lang="en-US" sz="1100" b="0" strike="noStrike" spc="-1">
               <a:latin typeface="Times New Roman"/>
@@ -4447,7 +4452,7 @@
                 </a:solidFill>
                 <a:latin typeface="Century Gothic"/>
               </a:rPr>
-              <a:t>4/14/19</a:t>
+              <a:t>4/15/19</a:t>
             </a:fld>
             <a:endParaRPr lang="en-US" sz="1100" b="0" strike="noStrike" spc="-1">
               <a:latin typeface="Times New Roman"/>
@@ -5680,7 +5685,7 @@
                 </a:solidFill>
                 <a:latin typeface="Century Gothic"/>
               </a:rPr>
-              <a:t>Contributions here…</a:t>
+              <a:t>Worked on Speech-to-text development in Python during iteration 1. </a:t>
             </a:r>
           </a:p>
           <a:p>
@@ -5705,8 +5710,215 @@
                 </a:solidFill>
                 <a:latin typeface="Century Gothic"/>
               </a:rPr>
-              <a:t>Which user stories? </a:t>
-            </a:r>
+              <a:t>Worked on Resume </a:t>
+            </a:r>
+            <a:r>
+              <a:rPr lang="en-US" sz="2000" spc="-1" dirty="0">
+                <a:solidFill>
+                  <a:srgbClr val="FFFFFF"/>
+                </a:solidFill>
+                <a:latin typeface="Century Gothic"/>
+              </a:rPr>
+              <a:t>templates and gave inputs on editing them as per our need. Also worked to some extent on CSS and HTML files to enable the questions and answers to function properly. </a:t>
+            </a:r>
+          </a:p>
+          <a:p>
+            <a:pPr marL="343080" indent="-342720">
+              <a:lnSpc>
+                <a:spcPct val="100000"/>
+              </a:lnSpc>
+              <a:spcBef>
+                <a:spcPts val="1001"/>
+              </a:spcBef>
+              <a:buClr>
+                <a:srgbClr val="8AD0D6"/>
+              </a:buClr>
+              <a:buSzPct val="80000"/>
+              <a:buFont typeface="Wingdings 3" charset="2"/>
+              <a:buChar char=""/>
+            </a:pPr>
+            <a:r>
+              <a:rPr lang="en-US" sz="2000" spc="-1" dirty="0">
+                <a:solidFill>
+                  <a:srgbClr val="FFFFFF"/>
+                </a:solidFill>
+                <a:latin typeface="Century Gothic"/>
+              </a:rPr>
+              <a:t>Worked on the </a:t>
+            </a:r>
+            <a:r>
+              <a:rPr lang="en-US" sz="2000" spc="-1" dirty="0" err="1">
+                <a:solidFill>
+                  <a:srgbClr val="FFFFFF"/>
+                </a:solidFill>
+                <a:latin typeface="Century Gothic"/>
+              </a:rPr>
+              <a:t>tsl</a:t>
+            </a:r>
+            <a:r>
+              <a:rPr lang="en-US" sz="2000" spc="-1" dirty="0">
+                <a:solidFill>
+                  <a:srgbClr val="FFFFFF"/>
+                </a:solidFill>
+                <a:latin typeface="Century Gothic"/>
+              </a:rPr>
+              <a:t> test cases. </a:t>
+            </a:r>
+          </a:p>
+          <a:p>
+            <a:pPr marL="360">
+              <a:lnSpc>
+                <a:spcPct val="100000"/>
+              </a:lnSpc>
+              <a:spcBef>
+                <a:spcPts val="1001"/>
+              </a:spcBef>
+              <a:buClr>
+                <a:srgbClr val="8AD0D6"/>
+              </a:buClr>
+              <a:buSzPct val="80000"/>
+            </a:pPr>
+            <a:endParaRPr lang="en-US" sz="2000" spc="-1" dirty="0">
+              <a:solidFill>
+                <a:srgbClr val="FFFFFF"/>
+              </a:solidFill>
+              <a:latin typeface="Century Gothic"/>
+            </a:endParaRPr>
+          </a:p>
+          <a:p>
+            <a:pPr marL="360">
+              <a:lnSpc>
+                <a:spcPct val="100000"/>
+              </a:lnSpc>
+              <a:spcBef>
+                <a:spcPts val="1001"/>
+              </a:spcBef>
+              <a:buClr>
+                <a:srgbClr val="8AD0D6"/>
+              </a:buClr>
+              <a:buSzPct val="80000"/>
+            </a:pPr>
+            <a:r>
+              <a:rPr lang="en-US" sz="2000" spc="-1" dirty="0">
+                <a:solidFill>
+                  <a:srgbClr val="FFFFFF"/>
+                </a:solidFill>
+                <a:latin typeface="Century Gothic"/>
+              </a:rPr>
+              <a:t>Which user stories ?</a:t>
+            </a:r>
+          </a:p>
+          <a:p>
+            <a:pPr marL="343260" indent="-342900">
+              <a:lnSpc>
+                <a:spcPct val="100000"/>
+              </a:lnSpc>
+              <a:spcBef>
+                <a:spcPts val="1001"/>
+              </a:spcBef>
+              <a:buClr>
+                <a:srgbClr val="8AD0D6"/>
+              </a:buClr>
+              <a:buSzPct val="80000"/>
+              <a:buFont typeface="Wingdings" pitchFamily="2" charset="2"/>
+              <a:buChar char="Ø"/>
+            </a:pPr>
+            <a:r>
+              <a:rPr lang="en-US" sz="2000" spc="-1" dirty="0">
+                <a:solidFill>
+                  <a:srgbClr val="FFFFFF"/>
+                </a:solidFill>
+                <a:latin typeface="Century Gothic"/>
+              </a:rPr>
+              <a:t>Accurate speech-to-text bot</a:t>
+            </a:r>
+          </a:p>
+          <a:p>
+            <a:pPr marL="343260" indent="-342900">
+              <a:lnSpc>
+                <a:spcPct val="100000"/>
+              </a:lnSpc>
+              <a:spcBef>
+                <a:spcPts val="1001"/>
+              </a:spcBef>
+              <a:buClr>
+                <a:srgbClr val="8AD0D6"/>
+              </a:buClr>
+              <a:buSzPct val="80000"/>
+              <a:buFont typeface="Wingdings" pitchFamily="2" charset="2"/>
+              <a:buChar char="Ø"/>
+            </a:pPr>
+            <a:r>
+              <a:rPr lang="en-US" sz="2000" spc="-1" dirty="0">
+                <a:solidFill>
+                  <a:srgbClr val="FFFFFF"/>
+                </a:solidFill>
+                <a:latin typeface="Century Gothic"/>
+              </a:rPr>
+              <a:t>Unique resume </a:t>
+            </a:r>
+            <a:r>
+              <a:rPr lang="en-US" sz="2000" spc="-1" dirty="0" err="1">
+                <a:solidFill>
+                  <a:srgbClr val="FFFFFF"/>
+                </a:solidFill>
+                <a:latin typeface="Century Gothic"/>
+              </a:rPr>
+              <a:t>tempelates</a:t>
+            </a:r>
+            <a:endParaRPr lang="en-US" sz="2000" spc="-1" dirty="0">
+              <a:solidFill>
+                <a:srgbClr val="FFFFFF"/>
+              </a:solidFill>
+              <a:latin typeface="Century Gothic"/>
+            </a:endParaRPr>
+          </a:p>
+          <a:p>
+            <a:pPr marL="343260" indent="-342900">
+              <a:lnSpc>
+                <a:spcPct val="100000"/>
+              </a:lnSpc>
+              <a:spcBef>
+                <a:spcPts val="1001"/>
+              </a:spcBef>
+              <a:buClr>
+                <a:srgbClr val="8AD0D6"/>
+              </a:buClr>
+              <a:buSzPct val="80000"/>
+              <a:buFont typeface="Wingdings" pitchFamily="2" charset="2"/>
+              <a:buChar char="Ø"/>
+            </a:pPr>
+            <a:r>
+              <a:rPr lang="en-US" sz="2000" spc="-1" dirty="0">
+                <a:solidFill>
+                  <a:srgbClr val="FFFFFF"/>
+                </a:solidFill>
+                <a:latin typeface="Century Gothic"/>
+              </a:rPr>
+              <a:t>Background noise and microphone quality </a:t>
+            </a:r>
+          </a:p>
+          <a:p>
+            <a:pPr marL="343260" indent="-342900">
+              <a:lnSpc>
+                <a:spcPct val="100000"/>
+              </a:lnSpc>
+              <a:spcBef>
+                <a:spcPts val="1001"/>
+              </a:spcBef>
+              <a:buClr>
+                <a:srgbClr val="8AD0D6"/>
+              </a:buClr>
+              <a:buSzPct val="80000"/>
+              <a:buFont typeface="Wingdings" pitchFamily="2" charset="2"/>
+              <a:buChar char="Ø"/>
+            </a:pPr>
+            <a:endParaRPr lang="en-US" sz="2000" spc="-1" dirty="0">
+              <a:solidFill>
+                <a:srgbClr val="FFFFFF"/>
+              </a:solidFill>
+              <a:latin typeface="Century Gothic"/>
+            </a:endParaRPr>
           </a:p>
         </p:txBody>
       </p:sp>
@@ -6359,6 +6571,12 @@
               </a:rPr>
               <a:t>Resolving Review and Edit feature with the Export to PDF feature.</a:t>
             </a:r>
+            <a:endParaRPr lang="en-US" sz="2000" spc="-1" dirty="0">
+              <a:solidFill>
+                <a:srgbClr val="FFFFFF"/>
+              </a:solidFill>
+              <a:latin typeface="Century Gothic"/>
+            </a:endParaRPr>
           </a:p>
           <a:p>
             <a:pPr marL="343080" indent="-342720">
@@ -6375,12 +6593,15 @@
               <a:buFont typeface="Wingdings 3" charset="2"/>
               <a:buChar char=""/>
             </a:pPr>
-            <a:endParaRPr lang="en-US" sz="2000" b="0" strike="noStrike" spc="-1" dirty="0">
-              <a:solidFill>
-                <a:srgbClr val="FFFFFF"/>
-              </a:solidFill>
-              <a:latin typeface="Century Gothic"/>
-            </a:endParaRPr>
+            <a:r>
+              <a:rPr lang="en-US" sz="2000" spc="-1" dirty="0">
+                <a:solidFill>
+                  <a:srgbClr val="FFFFFF"/>
+                </a:solidFill>
+                <a:latin typeface="Century Gothic"/>
+              </a:rPr>
+              <a:t>Solving the microphone firewall issue.</a:t>
+            </a:r>
           </a:p>
           <a:p>
             <a:pPr marL="343080" indent="-342720">
@@ -6397,12 +6618,15 @@
               <a:buFont typeface="Wingdings 3" charset="2"/>
               <a:buChar char=""/>
             </a:pPr>
-            <a:endParaRPr lang="en-US" sz="2800" b="0" strike="noStrike" spc="-1" dirty="0">
-              <a:solidFill>
-                <a:srgbClr val="FFFFFF"/>
-              </a:solidFill>
-              <a:latin typeface="Century Gothic"/>
-            </a:endParaRPr>
+            <a:r>
+              <a:rPr lang="en-US" sz="2000" spc="-1" dirty="0">
+                <a:solidFill>
+                  <a:srgbClr val="FFFFFF"/>
+                </a:solidFill>
+                <a:latin typeface="Century Gothic"/>
+              </a:rPr>
+              <a:t>Getting the test cases set up as the main component was speech to text. </a:t>
+            </a:r>
           </a:p>
         </p:txBody>
       </p:sp>

</xml_diff>